<commit_message>
Update Victoria Car Accident - Group 9 Project 3 Presentation.pptx
</commit_message>
<xml_diff>
--- a/Presentation/Victoria Car Accident - Group 9 Project 3 Presentation.pptx
+++ b/Presentation/Victoria Car Accident - Group 9 Project 3 Presentation.pptx
@@ -9771,7 +9771,7 @@
         <p:spPr>
           <a:xfrm>
             <a:off x="4572000" y="1905050"/>
-            <a:ext cx="2653500" cy="1262100"/>
+            <a:ext cx="2653500" cy="1046700"/>
           </a:xfrm>
           <a:prstGeom prst="rect">
             <a:avLst/>
@@ -9815,12 +9815,18 @@
                 <a:cs typeface="Malgun Gothic"/>
                 <a:sym typeface="Malgun Gothic"/>
               </a:rPr>
-              <a:t>leaflet.js, plotly.js, d3.js and “ “</a:t>
+              <a:t>leaflet.js, plotly.js, d3.js and highcharts.js </a:t>
+            </a:r>
+            <a:r>
+              <a:rPr lang="en-US">
+                <a:latin typeface="Malgun Gothic"/>
+                <a:ea typeface="Malgun Gothic"/>
+                <a:cs typeface="Malgun Gothic"/>
+                <a:sym typeface="Malgun Gothic"/>
+              </a:rPr>
+              <a:t>used to create </a:t>
             </a:r>
             <a:endParaRPr>
-              <a:solidFill>
-                <a:schemeClr val="dk1"/>
-              </a:solidFill>
               <a:latin typeface="Malgun Gothic"/>
               <a:ea typeface="Malgun Gothic"/>
               <a:cs typeface="Malgun Gothic"/>
@@ -9844,7 +9850,7 @@
                 <a:cs typeface="Malgun Gothic"/>
                 <a:sym typeface="Malgun Gothic"/>
               </a:rPr>
-              <a:t>used to create webpage and </a:t>
+              <a:t>the webpage and </a:t>
             </a:r>
             <a:r>
               <a:rPr lang="en-US">
@@ -9853,7 +9859,7 @@
                 <a:cs typeface="Malgun Gothic"/>
                 <a:sym typeface="Malgun Gothic"/>
               </a:rPr>
-              <a:t>visualisations</a:t>
+              <a:t>visualisations.</a:t>
             </a:r>
             <a:endParaRPr>
               <a:latin typeface="Malgun Gothic"/>

</xml_diff>